<commit_message>
Update project presentation with the newer block scheme.
</commit_message>
<xml_diff>
--- a/Presentation materials/String Project Presentation.pptx
+++ b/Presentation materials/String Project Presentation.pptx
@@ -126,6 +126,7 @@
     <p1510:client id="{88171253-0866-5EA7-E32E-7BBA86B53547}" v="238" dt="2020-06-11T20:02:52.022"/>
     <p1510:client id="{886CD7FC-EB62-5A6E-2774-720A6648698E}" v="1007" dt="2020-06-10T20:25:20.529"/>
     <p1510:client id="{9BB91191-DE55-D1F6-8B5F-F93A452AFFA8}" v="18" dt="2020-06-11T09:16:45.575"/>
+    <p1510:client id="{FC6B1DE2-72FC-B1BD-97A9-DF7E344D9C40}" v="7" dt="2020-06-12T21:12:30.972"/>
   </p1510:revLst>
 </p1510:revInfo>
 </file>
@@ -1264,54 +1265,6 @@
           </pc:sldLayoutMkLst>
         </pc:sldLayoutChg>
       </pc:sldMasterChg>
-    </pc:docChg>
-  </pc:docChgLst>
-  <pc:docChgLst>
-    <pc:chgData name="Теодор Боянов Димов" userId="S::tbdimov18@codingburgas.bg::f9681388-57bc-4215-9a2f-909f8569cceb" providerId="AD" clId="Web-{9BB91191-DE55-D1F6-8B5F-F93A452AFFA8}"/>
-    <pc:docChg chg="modSld">
-      <pc:chgData name="Теодор Боянов Димов" userId="S::tbdimov18@codingburgas.bg::f9681388-57bc-4215-9a2f-909f8569cceb" providerId="AD" clId="Web-{9BB91191-DE55-D1F6-8B5F-F93A452AFFA8}" dt="2020-06-11T09:16:45.575" v="17"/>
-      <pc:docMkLst>
-        <pc:docMk/>
-      </pc:docMkLst>
-      <pc:sldChg chg="addSp delSp modSp">
-        <pc:chgData name="Теодор Боянов Димов" userId="S::tbdimov18@codingburgas.bg::f9681388-57bc-4215-9a2f-909f8569cceb" providerId="AD" clId="Web-{9BB91191-DE55-D1F6-8B5F-F93A452AFFA8}" dt="2020-06-11T09:16:45.575" v="17"/>
-        <pc:sldMkLst>
-          <pc:docMk/>
-          <pc:sldMk cId="558141682" sldId="257"/>
-        </pc:sldMkLst>
-        <pc:spChg chg="mod">
-          <ac:chgData name="Теодор Боянов Димов" userId="S::tbdimov18@codingburgas.bg::f9681388-57bc-4215-9a2f-909f8569cceb" providerId="AD" clId="Web-{9BB91191-DE55-D1F6-8B5F-F93A452AFFA8}" dt="2020-06-11T09:16:26.777" v="13" actId="1076"/>
-          <ac:spMkLst>
-            <pc:docMk/>
-            <pc:sldMk cId="558141682" sldId="257"/>
-            <ac:spMk id="2" creationId="{74ABB9E9-367E-4180-8A52-4DBFA7688591}"/>
-          </ac:spMkLst>
-        </pc:spChg>
-        <pc:spChg chg="add del mod ord">
-          <ac:chgData name="Теодор Боянов Димов" userId="S::tbdimov18@codingburgas.bg::f9681388-57bc-4215-9a2f-909f8569cceb" providerId="AD" clId="Web-{9BB91191-DE55-D1F6-8B5F-F93A452AFFA8}" dt="2020-06-11T09:16:40.044" v="15"/>
-          <ac:spMkLst>
-            <pc:docMk/>
-            <pc:sldMk cId="558141682" sldId="257"/>
-            <ac:spMk id="4" creationId="{266DD0DE-80CA-4DAE-A5E5-86FCE2E4D1D6}"/>
-          </ac:spMkLst>
-        </pc:spChg>
-        <pc:spChg chg="add del">
-          <ac:chgData name="Теодор Боянов Димов" userId="S::tbdimov18@codingburgas.bg::f9681388-57bc-4215-9a2f-909f8569cceb" providerId="AD" clId="Web-{9BB91191-DE55-D1F6-8B5F-F93A452AFFA8}" dt="2020-06-11T09:16:45.575" v="17"/>
-          <ac:spMkLst>
-            <pc:docMk/>
-            <pc:sldMk cId="558141682" sldId="257"/>
-            <ac:spMk id="5" creationId="{DE3E0292-0214-47A2-B5C5-4D201DFD7946}"/>
-          </ac:spMkLst>
-        </pc:spChg>
-        <pc:spChg chg="ord">
-          <ac:chgData name="Теодор Боянов Димов" userId="S::tbdimov18@codingburgas.bg::f9681388-57bc-4215-9a2f-909f8569cceb" providerId="AD" clId="Web-{9BB91191-DE55-D1F6-8B5F-F93A452AFFA8}" dt="2020-06-11T09:15:37.978" v="4"/>
-          <ac:spMkLst>
-            <pc:docMk/>
-            <pc:sldMk cId="558141682" sldId="257"/>
-            <ac:spMk id="26" creationId="{5DB23C2B-2054-4D8B-9E98-9190F8E05EAD}"/>
-          </ac:spMkLst>
-        </pc:spChg>
-      </pc:sldChg>
     </pc:docChg>
   </pc:docChgLst>
   <pc:docChgLst>
@@ -1663,6 +1616,158 @@
             <ac:cxnSpMk id="16" creationId="{158D888F-D87A-4C3C-BD82-273E4C8C5E83}"/>
           </ac:cxnSpMkLst>
         </pc:cxnChg>
+      </pc:sldChg>
+    </pc:docChg>
+  </pc:docChgLst>
+  <pc:docChgLst>
+    <pc:chgData name="Теодор Боянов Димов" userId="S::tbdimov18@codingburgas.bg::f9681388-57bc-4215-9a2f-909f8569cceb" providerId="AD" clId="Web-{9BB91191-DE55-D1F6-8B5F-F93A452AFFA8}"/>
+    <pc:docChg chg="modSld">
+      <pc:chgData name="Теодор Боянов Димов" userId="S::tbdimov18@codingburgas.bg::f9681388-57bc-4215-9a2f-909f8569cceb" providerId="AD" clId="Web-{9BB91191-DE55-D1F6-8B5F-F93A452AFFA8}" dt="2020-06-11T09:16:45.575" v="17"/>
+      <pc:docMkLst>
+        <pc:docMk/>
+      </pc:docMkLst>
+      <pc:sldChg chg="addSp delSp modSp">
+        <pc:chgData name="Теодор Боянов Димов" userId="S::tbdimov18@codingburgas.bg::f9681388-57bc-4215-9a2f-909f8569cceb" providerId="AD" clId="Web-{9BB91191-DE55-D1F6-8B5F-F93A452AFFA8}" dt="2020-06-11T09:16:45.575" v="17"/>
+        <pc:sldMkLst>
+          <pc:docMk/>
+          <pc:sldMk cId="558141682" sldId="257"/>
+        </pc:sldMkLst>
+        <pc:spChg chg="mod">
+          <ac:chgData name="Теодор Боянов Димов" userId="S::tbdimov18@codingburgas.bg::f9681388-57bc-4215-9a2f-909f8569cceb" providerId="AD" clId="Web-{9BB91191-DE55-D1F6-8B5F-F93A452AFFA8}" dt="2020-06-11T09:16:26.777" v="13" actId="1076"/>
+          <ac:spMkLst>
+            <pc:docMk/>
+            <pc:sldMk cId="558141682" sldId="257"/>
+            <ac:spMk id="2" creationId="{74ABB9E9-367E-4180-8A52-4DBFA7688591}"/>
+          </ac:spMkLst>
+        </pc:spChg>
+        <pc:spChg chg="add del mod ord">
+          <ac:chgData name="Теодор Боянов Димов" userId="S::tbdimov18@codingburgas.bg::f9681388-57bc-4215-9a2f-909f8569cceb" providerId="AD" clId="Web-{9BB91191-DE55-D1F6-8B5F-F93A452AFFA8}" dt="2020-06-11T09:16:40.044" v="15"/>
+          <ac:spMkLst>
+            <pc:docMk/>
+            <pc:sldMk cId="558141682" sldId="257"/>
+            <ac:spMk id="4" creationId="{266DD0DE-80CA-4DAE-A5E5-86FCE2E4D1D6}"/>
+          </ac:spMkLst>
+        </pc:spChg>
+        <pc:spChg chg="add del">
+          <ac:chgData name="Теодор Боянов Димов" userId="S::tbdimov18@codingburgas.bg::f9681388-57bc-4215-9a2f-909f8569cceb" providerId="AD" clId="Web-{9BB91191-DE55-D1F6-8B5F-F93A452AFFA8}" dt="2020-06-11T09:16:45.575" v="17"/>
+          <ac:spMkLst>
+            <pc:docMk/>
+            <pc:sldMk cId="558141682" sldId="257"/>
+            <ac:spMk id="5" creationId="{DE3E0292-0214-47A2-B5C5-4D201DFD7946}"/>
+          </ac:spMkLst>
+        </pc:spChg>
+        <pc:spChg chg="ord">
+          <ac:chgData name="Теодор Боянов Димов" userId="S::tbdimov18@codingburgas.bg::f9681388-57bc-4215-9a2f-909f8569cceb" providerId="AD" clId="Web-{9BB91191-DE55-D1F6-8B5F-F93A452AFFA8}" dt="2020-06-11T09:15:37.978" v="4"/>
+          <ac:spMkLst>
+            <pc:docMk/>
+            <pc:sldMk cId="558141682" sldId="257"/>
+            <ac:spMk id="26" creationId="{5DB23C2B-2054-4D8B-9E98-9190F8E05EAD}"/>
+          </ac:spMkLst>
+        </pc:spChg>
+      </pc:sldChg>
+    </pc:docChg>
+  </pc:docChgLst>
+  <pc:docChgLst>
+    <pc:chgData name="Кристиан Асенов Миланов" userId="S::kamilanov18@codingburgas.bg::32b1d455-e611-4bcf-8241-f40c7dd43d44" providerId="AD" clId="Web-{FC6B1DE2-72FC-B1BD-97A9-DF7E344D9C40}"/>
+    <pc:docChg chg="modSld">
+      <pc:chgData name="Кристиан Асенов Миланов" userId="S::kamilanov18@codingburgas.bg::32b1d455-e611-4bcf-8241-f40c7dd43d44" providerId="AD" clId="Web-{FC6B1DE2-72FC-B1BD-97A9-DF7E344D9C40}" dt="2020-06-12T21:12:30.972" v="6" actId="14100"/>
+      <pc:docMkLst>
+        <pc:docMk/>
+      </pc:docMkLst>
+      <pc:sldChg chg="addSp delSp modSp">
+        <pc:chgData name="Кристиан Асенов Миланов" userId="S::kamilanov18@codingburgas.bg::32b1d455-e611-4bcf-8241-f40c7dd43d44" providerId="AD" clId="Web-{FC6B1DE2-72FC-B1BD-97A9-DF7E344D9C40}" dt="2020-06-12T21:12:30.972" v="6" actId="14100"/>
+        <pc:sldMkLst>
+          <pc:docMk/>
+          <pc:sldMk cId="904531994" sldId="263"/>
+        </pc:sldMkLst>
+        <pc:spChg chg="mod">
+          <ac:chgData name="Кристиан Асенов Миланов" userId="S::kamilanov18@codingburgas.bg::32b1d455-e611-4bcf-8241-f40c7dd43d44" providerId="AD" clId="Web-{FC6B1DE2-72FC-B1BD-97A9-DF7E344D9C40}" dt="2020-06-12T21:12:10.113" v="2"/>
+          <ac:spMkLst>
+            <pc:docMk/>
+            <pc:sldMk cId="904531994" sldId="263"/>
+            <ac:spMk id="2" creationId="{5FDDABC2-5157-4AAF-BEC4-74F61BD2B2B2}"/>
+          </ac:spMkLst>
+        </pc:spChg>
+        <pc:spChg chg="del">
+          <ac:chgData name="Кристиан Асенов Миланов" userId="S::kamilanov18@codingburgas.bg::32b1d455-e611-4bcf-8241-f40c7dd43d44" providerId="AD" clId="Web-{FC6B1DE2-72FC-B1BD-97A9-DF7E344D9C40}" dt="2020-06-12T21:12:10.113" v="2"/>
+          <ac:spMkLst>
+            <pc:docMk/>
+            <pc:sldMk cId="904531994" sldId="263"/>
+            <ac:spMk id="11" creationId="{C6ADA6A4-0E3A-4918-B6D4-22715A55CCB1}"/>
+          </ac:spMkLst>
+        </pc:spChg>
+        <pc:spChg chg="del">
+          <ac:chgData name="Кристиан Асенов Миланов" userId="S::kamilanov18@codingburgas.bg::32b1d455-e611-4bcf-8241-f40c7dd43d44" providerId="AD" clId="Web-{FC6B1DE2-72FC-B1BD-97A9-DF7E344D9C40}" dt="2020-06-12T21:12:10.113" v="2"/>
+          <ac:spMkLst>
+            <pc:docMk/>
+            <pc:sldMk cId="904531994" sldId="263"/>
+            <ac:spMk id="13" creationId="{D79EF8B0-F266-4D16-A66B-C33723680BA0}"/>
+          </ac:spMkLst>
+        </pc:spChg>
+        <pc:spChg chg="del">
+          <ac:chgData name="Кристиан Асенов Миланов" userId="S::kamilanov18@codingburgas.bg::32b1d455-e611-4bcf-8241-f40c7dd43d44" providerId="AD" clId="Web-{FC6B1DE2-72FC-B1BD-97A9-DF7E344D9C40}" dt="2020-06-12T21:12:10.113" v="2"/>
+          <ac:spMkLst>
+            <pc:docMk/>
+            <pc:sldMk cId="904531994" sldId="263"/>
+            <ac:spMk id="15" creationId="{D9D0B110-82F6-41DA-8945-C8411E576A0B}"/>
+          </ac:spMkLst>
+        </pc:spChg>
+        <pc:spChg chg="add">
+          <ac:chgData name="Кристиан Асенов Миланов" userId="S::kamilanov18@codingburgas.bg::32b1d455-e611-4bcf-8241-f40c7dd43d44" providerId="AD" clId="Web-{FC6B1DE2-72FC-B1BD-97A9-DF7E344D9C40}" dt="2020-06-12T21:12:10.113" v="2"/>
+          <ac:spMkLst>
+            <pc:docMk/>
+            <pc:sldMk cId="904531994" sldId="263"/>
+            <ac:spMk id="17" creationId="{AF37826C-4A8B-4AA5-BE8C-A755B1970A22}"/>
+          </ac:spMkLst>
+        </pc:spChg>
+        <pc:spChg chg="add">
+          <ac:chgData name="Кристиан Асенов Миланов" userId="S::kamilanov18@codingburgas.bg::32b1d455-e611-4bcf-8241-f40c7dd43d44" providerId="AD" clId="Web-{FC6B1DE2-72FC-B1BD-97A9-DF7E344D9C40}" dt="2020-06-12T21:12:10.113" v="2"/>
+          <ac:spMkLst>
+            <pc:docMk/>
+            <pc:sldMk cId="904531994" sldId="263"/>
+            <ac:spMk id="18" creationId="{BFB47C81-5765-4486-9BD1-E0EB32F4A0A8}"/>
+          </ac:spMkLst>
+        </pc:spChg>
+        <pc:spChg chg="add">
+          <ac:chgData name="Кристиан Асенов Миланов" userId="S::kamilanov18@codingburgas.bg::32b1d455-e611-4bcf-8241-f40c7dd43d44" providerId="AD" clId="Web-{FC6B1DE2-72FC-B1BD-97A9-DF7E344D9C40}" dt="2020-06-12T21:12:10.113" v="2"/>
+          <ac:spMkLst>
+            <pc:docMk/>
+            <pc:sldMk cId="904531994" sldId="263"/>
+            <ac:spMk id="19" creationId="{3AFD7E30-4FA2-4EF8-BB3C-096AAC3EE2DD}"/>
+          </ac:spMkLst>
+        </pc:spChg>
+        <pc:spChg chg="add">
+          <ac:chgData name="Кристиан Асенов Миланов" userId="S::kamilanov18@codingburgas.bg::32b1d455-e611-4bcf-8241-f40c7dd43d44" providerId="AD" clId="Web-{FC6B1DE2-72FC-B1BD-97A9-DF7E344D9C40}" dt="2020-06-12T21:12:10.113" v="2"/>
+          <ac:spMkLst>
+            <pc:docMk/>
+            <pc:sldMk cId="904531994" sldId="263"/>
+            <ac:spMk id="21" creationId="{C4BC7293-0492-4B68-88EF-6362B3E9BBF3}"/>
+          </ac:spMkLst>
+        </pc:spChg>
+        <pc:spChg chg="add">
+          <ac:chgData name="Кристиан Асенов Миланов" userId="S::kamilanov18@codingburgas.bg::32b1d455-e611-4bcf-8241-f40c7dd43d44" providerId="AD" clId="Web-{FC6B1DE2-72FC-B1BD-97A9-DF7E344D9C40}" dt="2020-06-12T21:12:10.113" v="2"/>
+          <ac:spMkLst>
+            <pc:docMk/>
+            <pc:sldMk cId="904531994" sldId="263"/>
+            <ac:spMk id="23" creationId="{7F22716B-0B4A-4DF5-8C68-165745EDFA15}"/>
+          </ac:spMkLst>
+        </pc:spChg>
+        <pc:picChg chg="del">
+          <ac:chgData name="Кристиан Асенов Миланов" userId="S::kamilanov18@codingburgas.bg::32b1d455-e611-4bcf-8241-f40c7dd43d44" providerId="AD" clId="Web-{FC6B1DE2-72FC-B1BD-97A9-DF7E344D9C40}" dt="2020-06-12T21:12:07.519" v="1"/>
+          <ac:picMkLst>
+            <pc:docMk/>
+            <pc:sldMk cId="904531994" sldId="263"/>
+            <ac:picMk id="3" creationId="{528495D9-9082-497A-B82F-1C03630EDFE1}"/>
+          </ac:picMkLst>
+        </pc:picChg>
+        <pc:picChg chg="add mod">
+          <ac:chgData name="Кристиан Асенов Миланов" userId="S::kamilanov18@codingburgas.bg::32b1d455-e611-4bcf-8241-f40c7dd43d44" providerId="AD" clId="Web-{FC6B1DE2-72FC-B1BD-97A9-DF7E344D9C40}" dt="2020-06-12T21:12:30.972" v="6" actId="14100"/>
+          <ac:picMkLst>
+            <pc:docMk/>
+            <pc:sldMk cId="904531994" sldId="263"/>
+            <ac:picMk id="4" creationId="{8CF11DFE-89FC-4349-9DD2-4291CF98EAFF}"/>
+          </ac:picMkLst>
+        </pc:picChg>
       </pc:sldChg>
     </pc:docChg>
   </pc:docChgLst>
@@ -2573,7 +2678,7 @@
             <a:fld id="{5586B75A-687E-405C-8A0B-8D00578BA2C3}" type="datetimeFigureOut">
               <a:rPr lang="en-US" dirty="0"/>
               <a:pPr/>
-              <a:t>6/11/2020</a:t>
+              <a:t>6/12/2020</a:t>
             </a:fld>
             <a:endParaRPr lang="en-US" dirty="0"/>
           </a:p>
@@ -2743,7 +2848,7 @@
             <a:fld id="{5586B75A-687E-405C-8A0B-8D00578BA2C3}" type="datetimeFigureOut">
               <a:rPr lang="en-US" dirty="0"/>
               <a:pPr/>
-              <a:t>6/11/2020</a:t>
+              <a:t>6/12/2020</a:t>
             </a:fld>
             <a:endParaRPr lang="en-US" dirty="0"/>
           </a:p>
@@ -2923,7 +3028,7 @@
             <a:fld id="{5586B75A-687E-405C-8A0B-8D00578BA2C3}" type="datetimeFigureOut">
               <a:rPr lang="en-US" dirty="0"/>
               <a:pPr/>
-              <a:t>6/11/2020</a:t>
+              <a:t>6/12/2020</a:t>
             </a:fld>
             <a:endParaRPr lang="en-US" dirty="0"/>
           </a:p>
@@ -3093,7 +3198,7 @@
             <a:fld id="{5586B75A-687E-405C-8A0B-8D00578BA2C3}" type="datetimeFigureOut">
               <a:rPr lang="en-US" dirty="0"/>
               <a:pPr/>
-              <a:t>6/11/2020</a:t>
+              <a:t>6/12/2020</a:t>
             </a:fld>
             <a:endParaRPr lang="en-US" dirty="0"/>
           </a:p>
@@ -3352,7 +3457,7 @@
             <a:fld id="{5586B75A-687E-405C-8A0B-8D00578BA2C3}" type="datetimeFigureOut">
               <a:rPr lang="en-US" dirty="0"/>
               <a:pPr/>
-              <a:t>6/11/2020</a:t>
+              <a:t>6/12/2020</a:t>
             </a:fld>
             <a:endParaRPr lang="en-US" dirty="0"/>
           </a:p>
@@ -3639,7 +3744,7 @@
             <a:fld id="{5586B75A-687E-405C-8A0B-8D00578BA2C3}" type="datetimeFigureOut">
               <a:rPr lang="en-US" dirty="0"/>
               <a:pPr/>
-              <a:t>6/11/2020</a:t>
+              <a:t>6/12/2020</a:t>
             </a:fld>
             <a:endParaRPr lang="en-US" dirty="0"/>
           </a:p>
@@ -4080,7 +4185,7 @@
             <a:fld id="{5586B75A-687E-405C-8A0B-8D00578BA2C3}" type="datetimeFigureOut">
               <a:rPr lang="en-US" dirty="0"/>
               <a:pPr/>
-              <a:t>6/11/2020</a:t>
+              <a:t>6/12/2020</a:t>
             </a:fld>
             <a:endParaRPr lang="en-US" dirty="0"/>
           </a:p>
@@ -4199,7 +4304,7 @@
             <a:fld id="{5586B75A-687E-405C-8A0B-8D00578BA2C3}" type="datetimeFigureOut">
               <a:rPr lang="en-US" dirty="0"/>
               <a:pPr/>
-              <a:t>6/11/2020</a:t>
+              <a:t>6/12/2020</a:t>
             </a:fld>
             <a:endParaRPr lang="en-US" dirty="0"/>
           </a:p>
@@ -4296,7 +4401,7 @@
             <a:fld id="{5586B75A-687E-405C-8A0B-8D00578BA2C3}" type="datetimeFigureOut">
               <a:rPr lang="en-US" dirty="0"/>
               <a:pPr/>
-              <a:t>6/11/2020</a:t>
+              <a:t>6/12/2020</a:t>
             </a:fld>
             <a:endParaRPr lang="en-US" dirty="0"/>
           </a:p>
@@ -4584,7 +4689,7 @@
             <a:fld id="{5586B75A-687E-405C-8A0B-8D00578BA2C3}" type="datetimeFigureOut">
               <a:rPr lang="en-US" dirty="0"/>
               <a:pPr/>
-              <a:t>6/11/2020</a:t>
+              <a:t>6/12/2020</a:t>
             </a:fld>
             <a:endParaRPr lang="en-US" dirty="0"/>
           </a:p>
@@ -4854,7 +4959,7 @@
             <a:fld id="{5586B75A-687E-405C-8A0B-8D00578BA2C3}" type="datetimeFigureOut">
               <a:rPr lang="en-US" dirty="0"/>
               <a:pPr/>
-              <a:t>6/11/2020</a:t>
+              <a:t>6/12/2020</a:t>
             </a:fld>
             <a:endParaRPr lang="en-US" dirty="0"/>
           </a:p>
@@ -5151,7 +5256,7 @@
             <a:fld id="{5586B75A-687E-405C-8A0B-8D00578BA2C3}" type="datetimeFigureOut">
               <a:rPr lang="en-US" dirty="0"/>
               <a:pPr/>
-              <a:t>6/11/2020</a:t>
+              <a:t>6/12/2020</a:t>
             </a:fld>
             <a:endParaRPr lang="en-US" dirty="0"/>
           </a:p>
@@ -5937,13 +6042,13 @@
   <p:clrMapOvr>
     <a:overrideClrMapping bg1="dk1" tx1="lt1" bg2="dk2" tx2="lt2" accent1="accent1" accent2="accent2" accent3="accent3" accent4="accent4" accent5="accent5" accent6="accent6" hlink="hlink" folHlink="folHlink"/>
   </p:clrMapOvr>
-  <mc:AlternateContent xmlns:mc="http://schemas.openxmlformats.org/markup-compatibility/2006">
-    <mc:Choice xmlns:p14="http://schemas.microsoft.com/office/powerpoint/2010/main" Requires="p14">
+  <mc:AlternateContent xmlns:mc="http://schemas.openxmlformats.org/markup-compatibility/2006" xmlns:p14="http://schemas.microsoft.com/office/powerpoint/2010/main">
+    <mc:Choice Requires="p14">
       <p:transition spd="med" p14:dur="700">
         <p:fade/>
       </p:transition>
     </mc:Choice>
-    <mc:Fallback>
+    <mc:Fallback xmlns="">
       <p:transition spd="med">
         <p:fade/>
       </p:transition>
@@ -6739,13 +6844,13 @@
   <p:clrMapOvr>
     <a:masterClrMapping/>
   </p:clrMapOvr>
-  <mc:AlternateContent xmlns:mc="http://schemas.openxmlformats.org/markup-compatibility/2006">
-    <mc:Choice xmlns:p14="http://schemas.microsoft.com/office/powerpoint/2010/main" Requires="p14">
+  <mc:AlternateContent xmlns:mc="http://schemas.openxmlformats.org/markup-compatibility/2006" xmlns:p14="http://schemas.microsoft.com/office/powerpoint/2010/main">
+    <mc:Choice Requires="p14">
       <p:transition spd="med" p14:dur="700">
         <p:fade/>
       </p:transition>
     </mc:Choice>
-    <mc:Fallback>
+    <mc:Fallback xmlns="">
       <p:transition spd="med">
         <p:fade/>
       </p:transition>
@@ -7162,13 +7267,13 @@
   <p:clrMapOvr>
     <a:overrideClrMapping bg1="dk1" tx1="lt1" bg2="dk2" tx2="lt2" accent1="accent1" accent2="accent2" accent3="accent3" accent4="accent4" accent5="accent5" accent6="accent6" hlink="hlink" folHlink="folHlink"/>
   </p:clrMapOvr>
-  <mc:AlternateContent xmlns:mc="http://schemas.openxmlformats.org/markup-compatibility/2006">
-    <mc:Choice xmlns:p14="http://schemas.microsoft.com/office/powerpoint/2010/main" Requires="p14">
+  <mc:AlternateContent xmlns:mc="http://schemas.openxmlformats.org/markup-compatibility/2006" xmlns:p14="http://schemas.microsoft.com/office/powerpoint/2010/main">
+    <mc:Choice Requires="p14">
       <p:transition spd="med" p14:dur="700">
         <p:fade/>
       </p:transition>
     </mc:Choice>
-    <mc:Fallback>
+    <mc:Fallback xmlns="">
       <p:transition spd="med">
         <p:fade/>
       </p:transition>
@@ -7449,13 +7554,13 @@
   <p:clrMapOvr>
     <a:masterClrMapping/>
   </p:clrMapOvr>
-  <mc:AlternateContent xmlns:mc="http://schemas.openxmlformats.org/markup-compatibility/2006">
-    <mc:Choice xmlns:p14="http://schemas.microsoft.com/office/powerpoint/2010/main" Requires="p14">
+  <mc:AlternateContent xmlns:mc="http://schemas.openxmlformats.org/markup-compatibility/2006" xmlns:p14="http://schemas.microsoft.com/office/powerpoint/2010/main">
+    <mc:Choice Requires="p14">
       <p:transition spd="med" p14:dur="700">
         <p:fade/>
       </p:transition>
     </mc:Choice>
-    <mc:Fallback>
+    <mc:Fallback xmlns="">
       <p:transition spd="med">
         <p:fade/>
       </p:transition>
@@ -7489,12 +7594,12 @@
           <a:chExt cx="0" cy="0"/>
         </a:xfrm>
       </p:grpSpPr>
-      <p:sp useBgFill="1">
-        <p:nvSpPr>
-          <p:cNvPr id="11" name="Rectangle 10">
+      <p:sp>
+        <p:nvSpPr>
+          <p:cNvPr id="17" name="Rectangle 19">
             <a:extLst>
               <a:ext uri="{FF2B5EF4-FFF2-40B4-BE49-F238E27FC236}">
-                <a16:creationId xmlns:a16="http://schemas.microsoft.com/office/drawing/2014/main" id="{C6ADA6A4-0E3A-4918-B6D4-22715A55CCB1}"/>
+                <a16:creationId xmlns:a16="http://schemas.microsoft.com/office/drawing/2014/main" id="{AF37826C-4A8B-4AA5-BE8C-A755B1970A22}"/>
               </a:ext>
               <a:ext uri="{C183D7F6-B498-43B3-948B-1728B52AA6E4}">
                 <adec:decorative xmlns:adec="http://schemas.microsoft.com/office/drawing/2017/decorative" val="1"/>
@@ -7514,8 +7619,120 @@
         </p:nvSpPr>
         <p:spPr>
           <a:xfrm>
+            <a:off x="0" y="761999"/>
+            <a:ext cx="9141619" cy="5334001"/>
+          </a:xfrm>
+          <a:prstGeom prst="rect">
+            <a:avLst/>
+          </a:prstGeom>
+          <a:solidFill>
+            <a:schemeClr val="accent1"/>
+          </a:solidFill>
+          <a:ln>
+            <a:noFill/>
+          </a:ln>
+        </p:spPr>
+        <p:style>
+          <a:lnRef idx="2">
+            <a:schemeClr val="accent1">
+              <a:shade val="50000"/>
+            </a:schemeClr>
+          </a:lnRef>
+          <a:fillRef idx="1">
+            <a:schemeClr val="accent1"/>
+          </a:fillRef>
+          <a:effectRef idx="0">
+            <a:schemeClr val="accent1"/>
+          </a:effectRef>
+          <a:fontRef idx="minor">
+            <a:schemeClr val="lt1"/>
+          </a:fontRef>
+        </p:style>
+      </p:sp>
+      <p:sp>
+        <p:nvSpPr>
+          <p:cNvPr id="18" name="Rectangle 21">
+            <a:extLst>
+              <a:ext uri="{FF2B5EF4-FFF2-40B4-BE49-F238E27FC236}">
+                <a16:creationId xmlns:a16="http://schemas.microsoft.com/office/drawing/2014/main" id="{BFB47C81-5765-4486-9BD1-E0EB32F4A0A8}"/>
+              </a:ext>
+              <a:ext uri="{C183D7F6-B498-43B3-948B-1728B52AA6E4}">
+                <adec:decorative xmlns:adec="http://schemas.microsoft.com/office/drawing/2017/decorative" val="1"/>
+              </a:ext>
+            </a:extLst>
+          </p:cNvPr>
+          <p:cNvSpPr>
+            <a:spLocks noGrp="1" noRot="1" noChangeAspect="1" noMove="1" noResize="1" noEditPoints="1" noAdjustHandles="1" noChangeArrowheads="1" noChangeShapeType="1" noTextEdit="1"/>
+          </p:cNvSpPr>
+          <p:nvPr>
+            <p:extLst>
+              <p:ext uri="{386F3935-93C4-4BCD-93E2-E3B085C9AB24}">
+                <p16:designElem xmlns:p16="http://schemas.microsoft.com/office/powerpoint/2015/main" val="1"/>
+              </p:ext>
+            </p:extLst>
+          </p:nvPr>
+        </p:nvSpPr>
+        <p:spPr>
+          <a:xfrm>
+            <a:off x="9270263" y="761999"/>
+            <a:ext cx="2925318" cy="5334001"/>
+          </a:xfrm>
+          <a:prstGeom prst="rect">
+            <a:avLst/>
+          </a:prstGeom>
+          <a:solidFill>
+            <a:srgbClr val="C8C8C8">
+              <a:alpha val="50000"/>
+            </a:srgbClr>
+          </a:solidFill>
+          <a:ln>
+            <a:noFill/>
+          </a:ln>
+        </p:spPr>
+        <p:style>
+          <a:lnRef idx="2">
+            <a:schemeClr val="accent1">
+              <a:shade val="50000"/>
+            </a:schemeClr>
+          </a:lnRef>
+          <a:fillRef idx="1">
+            <a:schemeClr val="accent1"/>
+          </a:fillRef>
+          <a:effectRef idx="0">
+            <a:schemeClr val="accent1"/>
+          </a:effectRef>
+          <a:fontRef idx="minor">
+            <a:schemeClr val="lt1"/>
+          </a:fontRef>
+        </p:style>
+      </p:sp>
+      <p:sp useBgFill="1">
+        <p:nvSpPr>
+          <p:cNvPr id="19" name="Rectangle 23">
+            <a:extLst>
+              <a:ext uri="{FF2B5EF4-FFF2-40B4-BE49-F238E27FC236}">
+                <a16:creationId xmlns:a16="http://schemas.microsoft.com/office/drawing/2014/main" id="{3AFD7E30-4FA2-4EF8-BB3C-096AAC3EE2DD}"/>
+              </a:ext>
+              <a:ext uri="{C183D7F6-B498-43B3-948B-1728B52AA6E4}">
+                <adec:decorative xmlns:adec="http://schemas.microsoft.com/office/drawing/2017/decorative" val="1"/>
+              </a:ext>
+            </a:extLst>
+          </p:cNvPr>
+          <p:cNvSpPr>
+            <a:spLocks noGrp="1" noRot="1" noChangeAspect="1" noMove="1" noResize="1" noEditPoints="1" noAdjustHandles="1" noChangeArrowheads="1" noChangeShapeType="1" noTextEdit="1"/>
+          </p:cNvSpPr>
+          <p:nvPr>
+            <p:extLst>
+              <p:ext uri="{386F3935-93C4-4BCD-93E2-E3B085C9AB24}">
+                <p16:designElem xmlns:p16="http://schemas.microsoft.com/office/powerpoint/2015/main" val="1"/>
+              </p:ext>
+            </p:extLst>
+          </p:nvPr>
+        </p:nvSpPr>
+        <p:spPr>
+          <a:xfrm>
             <a:off x="0" y="0"/>
-            <a:ext cx="12192000" cy="6858000"/>
+            <a:ext cx="12191999" cy="6858000"/>
           </a:xfrm>
           <a:prstGeom prst="rect">
             <a:avLst/>
@@ -7545,16 +7762,16 @@
           <a:lstStyle/>
           <a:p>
             <a:pPr algn="ctr"/>
-            <a:endParaRPr lang="en-US"/>
+            <a:endParaRPr lang="en-US" dirty="0"/>
           </a:p>
         </p:txBody>
       </p:sp>
       <p:sp>
         <p:nvSpPr>
-          <p:cNvPr id="13" name="Rectangle 12">
+          <p:cNvPr id="21" name="Rectangle 25">
             <a:extLst>
               <a:ext uri="{FF2B5EF4-FFF2-40B4-BE49-F238E27FC236}">
-                <a16:creationId xmlns:a16="http://schemas.microsoft.com/office/drawing/2014/main" id="{D79EF8B0-F266-4D16-A66B-C33723680BA0}"/>
+                <a16:creationId xmlns:a16="http://schemas.microsoft.com/office/drawing/2014/main" id="{C4BC7293-0492-4B68-88EF-6362B3E9BBF3}"/>
               </a:ext>
               <a:ext uri="{C183D7F6-B498-43B3-948B-1728B52AA6E4}">
                 <adec:decorative xmlns:adec="http://schemas.microsoft.com/office/drawing/2017/decorative" val="1"/>
@@ -7574,8 +7791,8 @@
         </p:nvSpPr>
         <p:spPr>
           <a:xfrm>
-            <a:off x="1" y="758952"/>
-            <a:ext cx="3443590" cy="5330952"/>
+            <a:off x="1" y="761999"/>
+            <a:ext cx="4642228" cy="5334001"/>
           </a:xfrm>
           <a:prstGeom prst="rect">
             <a:avLst/>
@@ -7622,29 +7839,59 @@
         </p:nvSpPr>
         <p:spPr>
           <a:xfrm>
-            <a:off x="252919" y="1123837"/>
-            <a:ext cx="2947482" cy="4601183"/>
+            <a:off x="1069849" y="1298448"/>
+            <a:ext cx="3258688" cy="3255264"/>
           </a:xfrm>
         </p:spPr>
         <p:txBody>
-          <a:bodyPr>
+          <a:bodyPr vert="horz" lIns="91440" tIns="45720" rIns="91440" bIns="45720" rtlCol="0" anchor="b">
             <a:normAutofit/>
           </a:bodyPr>
           <a:lstStyle/>
           <a:p>
             <a:r>
-              <a:rPr lang="en-US" sz="5000" dirty="0"/>
+              <a:rPr lang="en-US" sz="5400" spc="-100"/>
               <a:t>Block Scheme</a:t>
             </a:r>
           </a:p>
         </p:txBody>
       </p:sp>
-      <p:sp>
-        <p:nvSpPr>
-          <p:cNvPr id="15" name="Rectangle 14">
+      <p:pic>
+        <p:nvPicPr>
+          <p:cNvPr id="4" name="Picture 4" descr="A close up of a piece of paper&#10;&#10;Description generated with very high confidence">
             <a:extLst>
               <a:ext uri="{FF2B5EF4-FFF2-40B4-BE49-F238E27FC236}">
-                <a16:creationId xmlns:a16="http://schemas.microsoft.com/office/drawing/2014/main" id="{D9D0B110-82F6-41DA-8945-C8411E576A0B}"/>
+                <a16:creationId xmlns:a16="http://schemas.microsoft.com/office/drawing/2014/main" id="{8CF11DFE-89FC-4349-9DD2-4291CF98EAFF}"/>
+              </a:ext>
+            </a:extLst>
+          </p:cNvPr>
+          <p:cNvPicPr>
+            <a:picLocks noChangeAspect="1"/>
+          </p:cNvPicPr>
+          <p:nvPr/>
+        </p:nvPicPr>
+        <p:blipFill>
+          <a:blip r:embed="rId2"/>
+          <a:stretch>
+            <a:fillRect/>
+          </a:stretch>
+        </p:blipFill>
+        <p:spPr>
+          <a:xfrm>
+            <a:off x="4739640" y="1355434"/>
+            <a:ext cx="7045636" cy="4194735"/>
+          </a:xfrm>
+          <a:prstGeom prst="rect">
+            <a:avLst/>
+          </a:prstGeom>
+        </p:spPr>
+      </p:pic>
+      <p:sp>
+        <p:nvSpPr>
+          <p:cNvPr id="23" name="Rectangle 27">
+            <a:extLst>
+              <a:ext uri="{FF2B5EF4-FFF2-40B4-BE49-F238E27FC236}">
+                <a16:creationId xmlns:a16="http://schemas.microsoft.com/office/drawing/2014/main" id="{7F22716B-0B4A-4DF5-8C68-165745EDFA15}"/>
               </a:ext>
               <a:ext uri="{C183D7F6-B498-43B3-948B-1728B52AA6E4}">
                 <adec:decorative xmlns:adec="http://schemas.microsoft.com/office/drawing/2017/decorative" val="1"/>
@@ -7696,36 +7943,6 @@
           </a:fontRef>
         </p:style>
       </p:sp>
-      <p:pic>
-        <p:nvPicPr>
-          <p:cNvPr id="3" name="Picture 4" descr="A screenshot of a cell phone&#10;&#10;Description generated with very high confidence">
-            <a:extLst>
-              <a:ext uri="{FF2B5EF4-FFF2-40B4-BE49-F238E27FC236}">
-                <a16:creationId xmlns:a16="http://schemas.microsoft.com/office/drawing/2014/main" id="{528495D9-9082-497A-B82F-1C03630EDFE1}"/>
-              </a:ext>
-            </a:extLst>
-          </p:cNvPr>
-          <p:cNvPicPr>
-            <a:picLocks noChangeAspect="1"/>
-          </p:cNvPicPr>
-          <p:nvPr/>
-        </p:nvPicPr>
-        <p:blipFill>
-          <a:blip r:embed="rId2"/>
-          <a:stretch>
-            <a:fillRect/>
-          </a:stretch>
-        </p:blipFill>
-        <p:spPr>
-          <a:xfrm>
-            <a:off x="3857625" y="1573184"/>
-            <a:ext cx="7677150" cy="3702107"/>
-          </a:xfrm>
-          <a:prstGeom prst="rect">
-            <a:avLst/>
-          </a:prstGeom>
-        </p:spPr>
-      </p:pic>
     </p:spTree>
     <p:extLst>
       <p:ext uri="{BB962C8B-B14F-4D97-AF65-F5344CB8AC3E}">
@@ -7736,13 +7953,13 @@
   <p:clrMapOvr>
     <a:masterClrMapping/>
   </p:clrMapOvr>
-  <mc:AlternateContent xmlns:mc="http://schemas.openxmlformats.org/markup-compatibility/2006">
-    <mc:Choice xmlns:p14="http://schemas.microsoft.com/office/powerpoint/2010/main" Requires="p14">
+  <mc:AlternateContent xmlns:mc="http://schemas.openxmlformats.org/markup-compatibility/2006" xmlns:p14="http://schemas.microsoft.com/office/powerpoint/2010/main">
+    <mc:Choice Requires="p14">
       <p:transition spd="med" p14:dur="700">
         <p:fade/>
       </p:transition>
     </mc:Choice>
-    <mc:Fallback>
+    <mc:Fallback xmlns="">
       <p:transition spd="med">
         <p:fade/>
       </p:transition>
@@ -8136,13 +8353,13 @@
   <p:clrMapOvr>
     <a:overrideClrMapping bg1="dk1" tx1="lt1" bg2="dk2" tx2="lt2" accent1="accent1" accent2="accent2" accent3="accent3" accent4="accent4" accent5="accent5" accent6="accent6" hlink="hlink" folHlink="folHlink"/>
   </p:clrMapOvr>
-  <mc:AlternateContent xmlns:mc="http://schemas.openxmlformats.org/markup-compatibility/2006">
-    <mc:Choice xmlns:p14="http://schemas.microsoft.com/office/powerpoint/2010/main" Requires="p14">
+  <mc:AlternateContent xmlns:mc="http://schemas.openxmlformats.org/markup-compatibility/2006" xmlns:p14="http://schemas.microsoft.com/office/powerpoint/2010/main">
+    <mc:Choice Requires="p14">
       <p:transition spd="med" p14:dur="700">
         <p:fade/>
       </p:transition>
     </mc:Choice>
-    <mc:Fallback>
+    <mc:Fallback xmlns="">
       <p:transition spd="med">
         <p:fade/>
       </p:transition>
@@ -8534,13 +8751,13 @@
   <p:clrMapOvr>
     <a:masterClrMapping/>
   </p:clrMapOvr>
-  <mc:AlternateContent xmlns:mc="http://schemas.openxmlformats.org/markup-compatibility/2006">
-    <mc:Choice xmlns:p14="http://schemas.microsoft.com/office/powerpoint/2010/main" Requires="p14">
+  <mc:AlternateContent xmlns:mc="http://schemas.openxmlformats.org/markup-compatibility/2006" xmlns:p14="http://schemas.microsoft.com/office/powerpoint/2010/main">
+    <mc:Choice Requires="p14">
       <p:transition spd="med" p14:dur="700">
         <p:fade/>
       </p:transition>
     </mc:Choice>
-    <mc:Fallback>
+    <mc:Fallback xmlns="">
       <p:transition spd="med">
         <p:fade/>
       </p:transition>
@@ -8798,13 +9015,13 @@
   <p:clrMapOvr>
     <a:overrideClrMapping bg1="dk1" tx1="lt1" bg2="dk2" tx2="lt2" accent1="accent1" accent2="accent2" accent3="accent3" accent4="accent4" accent5="accent5" accent6="accent6" hlink="hlink" folHlink="folHlink"/>
   </p:clrMapOvr>
-  <mc:AlternateContent xmlns:mc="http://schemas.openxmlformats.org/markup-compatibility/2006">
-    <mc:Choice xmlns:p14="http://schemas.microsoft.com/office/powerpoint/2010/main" Requires="p14">
+  <mc:AlternateContent xmlns:mc="http://schemas.openxmlformats.org/markup-compatibility/2006" xmlns:p14="http://schemas.microsoft.com/office/powerpoint/2010/main">
+    <mc:Choice Requires="p14">
       <p:transition spd="slow" p14:dur="1500">
         <p:split orient="vert"/>
       </p:transition>
     </mc:Choice>
-    <mc:Fallback>
+    <mc:Fallback xmlns="">
       <p:transition spd="slow">
         <p:split orient="vert"/>
       </p:transition>

</xml_diff>